<commit_message>
Update 9. Graph Evolution Networks.pptx
</commit_message>
<xml_diff>
--- a/9. Graph Evolution Networks.pptx
+++ b/9. Graph Evolution Networks.pptx
@@ -19784,8 +19784,13 @@
             </a:pPr>
             <a:r>
               <a:rPr lang="en-US" dirty="0"/>
-              <a:t>Product Evaluations</a:t>
-            </a:r>
+              <a:t>Product </a:t>
+            </a:r>
+            <a:r>
+              <a:rPr lang="en-US" dirty="0" err="1"/>
+              <a:t>Evalutions</a:t>
+            </a:r>
+            <a:endParaRPr lang="en-US" dirty="0"/>
           </a:p>
         </p:txBody>
       </p:sp>

</xml_diff>